<commit_message>
Included information from verbal presentation into slide 5
</commit_message>
<xml_diff>
--- a/Zillow.pptx
+++ b/Zillow.pptx
@@ -9,6 +9,7 @@
     <p:sldId id="258" r:id="rId3"/>
     <p:sldId id="257" r:id="rId4"/>
     <p:sldId id="259" r:id="rId5"/>
+    <p:sldId id="260" r:id="rId6"/>
   </p:sldIdLst>
   <p:sldSz cx="12192000" cy="6858000"/>
   <p:notesSz cx="6858000" cy="9144000"/>
@@ -107,6 +108,11 @@
       </a:defRPr>
     </a:lvl9pPr>
   </p:defaultTextStyle>
+  <p:extLst>
+    <p:ext uri="{EFAFB233-063F-42B5-8137-9DF3F51BA10A}">
+      <p15:sldGuideLst xmlns:p15="http://schemas.microsoft.com/office/powerpoint/2012/main"/>
+    </p:ext>
+  </p:extLst>
 </p:presentation>
 </file>
 
@@ -3651,11 +3657,7 @@
           <a:p>
             <a:r>
               <a:rPr lang="en-US" dirty="0"/>
-              <a:t>Following square footage, additional bedrooms are more strongly correlated with assessed value than </a:t>
-            </a:r>
-            <a:r>
-              <a:rPr lang="en-US"/>
-              <a:t>additional bathrooms</a:t>
+              <a:t>Following square footage, additional bedrooms are more strongly correlated with assessed value than additional bathrooms</a:t>
             </a:r>
           </a:p>
           <a:p>
@@ -3673,6 +3675,120 @@
     <p:extLst>
       <p:ext uri="{BB962C8B-B14F-4D97-AF65-F5344CB8AC3E}">
         <p14:creationId xmlns:p14="http://schemas.microsoft.com/office/powerpoint/2010/main" val="424427542"/>
+      </p:ext>
+    </p:extLst>
+  </p:cSld>
+  <p:clrMapOvr>
+    <a:masterClrMapping/>
+  </p:clrMapOvr>
+</p:sld>
+</file>
+
+<file path=ppt/slides/slide5.xml><?xml version="1.0" encoding="utf-8"?>
+<p:sld xmlns:a="http://schemas.openxmlformats.org/drawingml/2006/main" xmlns:r="http://schemas.openxmlformats.org/officeDocument/2006/relationships" xmlns:p="http://schemas.openxmlformats.org/presentationml/2006/main">
+  <p:cSld>
+    <p:spTree>
+      <p:nvGrpSpPr>
+        <p:cNvPr id="1" name=""/>
+        <p:cNvGrpSpPr/>
+        <p:nvPr/>
+      </p:nvGrpSpPr>
+      <p:grpSpPr>
+        <a:xfrm>
+          <a:off x="0" y="0"/>
+          <a:ext cx="0" cy="0"/>
+          <a:chOff x="0" y="0"/>
+          <a:chExt cx="0" cy="0"/>
+        </a:xfrm>
+      </p:grpSpPr>
+      <p:sp>
+        <p:nvSpPr>
+          <p:cNvPr id="2" name="Title 1">
+            <a:extLst>
+              <a:ext uri="{FF2B5EF4-FFF2-40B4-BE49-F238E27FC236}">
+                <a16:creationId xmlns:a16="http://schemas.microsoft.com/office/drawing/2014/main" id="{1EC2A3DE-EA11-7242-B837-8C5D80183A27}"/>
+              </a:ext>
+            </a:extLst>
+          </p:cNvPr>
+          <p:cNvSpPr>
+            <a:spLocks noGrp="1"/>
+          </p:cNvSpPr>
+          <p:nvPr>
+            <p:ph type="title"/>
+          </p:nvPr>
+        </p:nvSpPr>
+        <p:spPr/>
+        <p:txBody>
+          <a:bodyPr/>
+          <a:lstStyle/>
+          <a:p>
+            <a:r>
+              <a:rPr lang="en-US" dirty="0"/>
+              <a:t>What the data </a:t>
+            </a:r>
+            <a:r>
+              <a:rPr lang="en-US" i="1" dirty="0"/>
+              <a:t>doesn’t</a:t>
+            </a:r>
+            <a:r>
+              <a:rPr lang="en-US" dirty="0"/>
+              <a:t> show</a:t>
+            </a:r>
+          </a:p>
+        </p:txBody>
+      </p:sp>
+      <p:sp>
+        <p:nvSpPr>
+          <p:cNvPr id="3" name="Content Placeholder 2">
+            <a:extLst>
+              <a:ext uri="{FF2B5EF4-FFF2-40B4-BE49-F238E27FC236}">
+                <a16:creationId xmlns:a16="http://schemas.microsoft.com/office/drawing/2014/main" id="{CE6F511E-C994-7245-A62A-5F95C35ADD14}"/>
+              </a:ext>
+            </a:extLst>
+          </p:cNvPr>
+          <p:cNvSpPr>
+            <a:spLocks noGrp="1"/>
+          </p:cNvSpPr>
+          <p:nvPr>
+            <p:ph idx="1"/>
+          </p:nvPr>
+        </p:nvSpPr>
+        <p:spPr/>
+        <p:txBody>
+          <a:bodyPr/>
+          <a:lstStyle/>
+          <a:p>
+            <a:pPr marL="0" indent="0">
+              <a:buNone/>
+            </a:pPr>
+            <a:r>
+              <a:rPr lang="en-US" dirty="0"/>
+              <a:t>Los Angeles County includes 87 different cities plus dozens of other legal entities. These include Beverly Hills, Malibu, Compton, Watts, and Beautiful Downtown Burbank. These all have vastly different factors driving pricing that are more significant that anything captured in the data set. The data should be localized.</a:t>
+            </a:r>
+          </a:p>
+          <a:p>
+            <a:pPr marL="0" indent="0">
+              <a:buNone/>
+            </a:pPr>
+            <a:r>
+              <a:rPr lang="en-US" dirty="0"/>
+              <a:t>Forecasting from this data would be greatly improved by merging in Census and Labor Department data and by using additional data from the database to establish </a:t>
+            </a:r>
+            <a:r>
+              <a:rPr lang="en-US"/>
+              <a:t>local metrics.</a:t>
+            </a:r>
+            <a:endParaRPr lang="en-US" dirty="0"/>
+          </a:p>
+          <a:p>
+            <a:endParaRPr lang="en-US" dirty="0"/>
+          </a:p>
+        </p:txBody>
+      </p:sp>
+    </p:spTree>
+    <p:extLst>
+      <p:ext uri="{BB962C8B-B14F-4D97-AF65-F5344CB8AC3E}">
+        <p14:creationId xmlns:p14="http://schemas.microsoft.com/office/powerpoint/2010/main" val="4050998109"/>
       </p:ext>
     </p:extLst>
   </p:cSld>

</xml_diff>